<commit_message>
Pitch slide price changed to Rs. 9,999
</commit_message>
<xml_diff>
--- a/Pitch Slides/Pravindu SLAP _ Final.pptx
+++ b/Pitch Slides/Pravindu SLAP _ Final.pptx
@@ -109,6 +109,11 @@
       </a:defRPr>
     </a:lvl9pPr>
   </p:defaultTextStyle>
+  <p:extLst>
+    <p:ext uri="{EFAFB233-063F-42B5-8137-9DF3F51BA10A}">
+      <p15:sldGuideLst xmlns:p15="http://schemas.microsoft.com/office/powerpoint/2012/main"/>
+    </p:ext>
+  </p:extLst>
 </p:presentation>
 </file>
 
@@ -259,7 +264,7 @@
           <a:p>
             <a:fld id="{0290B0A0-110E-4225-BA7E-B7399902071B}" type="datetimeFigureOut">
               <a:rPr lang="en-US" smtClean="0"/>
-              <a:t>8/24/2024</a:t>
+              <a:t>8/25/2024</a:t>
             </a:fld>
             <a:endParaRPr lang="en-US"/>
           </a:p>
@@ -457,7 +462,7 @@
           <a:p>
             <a:fld id="{0290B0A0-110E-4225-BA7E-B7399902071B}" type="datetimeFigureOut">
               <a:rPr lang="en-US" smtClean="0"/>
-              <a:t>8/24/2024</a:t>
+              <a:t>8/25/2024</a:t>
             </a:fld>
             <a:endParaRPr lang="en-US"/>
           </a:p>
@@ -665,7 +670,7 @@
           <a:p>
             <a:fld id="{0290B0A0-110E-4225-BA7E-B7399902071B}" type="datetimeFigureOut">
               <a:rPr lang="en-US" smtClean="0"/>
-              <a:t>8/24/2024</a:t>
+              <a:t>8/25/2024</a:t>
             </a:fld>
             <a:endParaRPr lang="en-US"/>
           </a:p>
@@ -863,7 +868,7 @@
           <a:p>
             <a:fld id="{0290B0A0-110E-4225-BA7E-B7399902071B}" type="datetimeFigureOut">
               <a:rPr lang="en-US" smtClean="0"/>
-              <a:t>8/24/2024</a:t>
+              <a:t>8/25/2024</a:t>
             </a:fld>
             <a:endParaRPr lang="en-US"/>
           </a:p>
@@ -1138,7 +1143,7 @@
           <a:p>
             <a:fld id="{0290B0A0-110E-4225-BA7E-B7399902071B}" type="datetimeFigureOut">
               <a:rPr lang="en-US" smtClean="0"/>
-              <a:t>8/24/2024</a:t>
+              <a:t>8/25/2024</a:t>
             </a:fld>
             <a:endParaRPr lang="en-US"/>
           </a:p>
@@ -1403,7 +1408,7 @@
           <a:p>
             <a:fld id="{0290B0A0-110E-4225-BA7E-B7399902071B}" type="datetimeFigureOut">
               <a:rPr lang="en-US" smtClean="0"/>
-              <a:t>8/24/2024</a:t>
+              <a:t>8/25/2024</a:t>
             </a:fld>
             <a:endParaRPr lang="en-US"/>
           </a:p>
@@ -1815,7 +1820,7 @@
           <a:p>
             <a:fld id="{0290B0A0-110E-4225-BA7E-B7399902071B}" type="datetimeFigureOut">
               <a:rPr lang="en-US" smtClean="0"/>
-              <a:t>8/24/2024</a:t>
+              <a:t>8/25/2024</a:t>
             </a:fld>
             <a:endParaRPr lang="en-US"/>
           </a:p>
@@ -1956,7 +1961,7 @@
           <a:p>
             <a:fld id="{0290B0A0-110E-4225-BA7E-B7399902071B}" type="datetimeFigureOut">
               <a:rPr lang="en-US" smtClean="0"/>
-              <a:t>8/24/2024</a:t>
+              <a:t>8/25/2024</a:t>
             </a:fld>
             <a:endParaRPr lang="en-US"/>
           </a:p>
@@ -2069,7 +2074,7 @@
           <a:p>
             <a:fld id="{0290B0A0-110E-4225-BA7E-B7399902071B}" type="datetimeFigureOut">
               <a:rPr lang="en-US" smtClean="0"/>
-              <a:t>8/24/2024</a:t>
+              <a:t>8/25/2024</a:t>
             </a:fld>
             <a:endParaRPr lang="en-US"/>
           </a:p>
@@ -2380,7 +2385,7 @@
           <a:p>
             <a:fld id="{0290B0A0-110E-4225-BA7E-B7399902071B}" type="datetimeFigureOut">
               <a:rPr lang="en-US" smtClean="0"/>
-              <a:t>8/24/2024</a:t>
+              <a:t>8/25/2024</a:t>
             </a:fld>
             <a:endParaRPr lang="en-US"/>
           </a:p>
@@ -2668,7 +2673,7 @@
           <a:p>
             <a:fld id="{0290B0A0-110E-4225-BA7E-B7399902071B}" type="datetimeFigureOut">
               <a:rPr lang="en-US" smtClean="0"/>
-              <a:t>8/24/2024</a:t>
+              <a:t>8/25/2024</a:t>
             </a:fld>
             <a:endParaRPr lang="en-US"/>
           </a:p>
@@ -2909,7 +2914,7 @@
           <a:p>
             <a:fld id="{0290B0A0-110E-4225-BA7E-B7399902071B}" type="datetimeFigureOut">
               <a:rPr lang="en-US" smtClean="0"/>
-              <a:t>8/24/2024</a:t>
+              <a:t>8/25/2024</a:t>
             </a:fld>
             <a:endParaRPr lang="en-US"/>
           </a:p>
@@ -10999,7 +11004,7 @@
                 </a:effectLst>
                 <a:latin typeface="Arial Rounded MT Bold" panose="020F0704030504030204" pitchFamily="34" charset="0"/>
               </a:rPr>
-              <a:t>Rs. 10,000</a:t>
+              <a:t>Rs. 9,999</a:t>
             </a:r>
           </a:p>
         </p:txBody>
@@ -11014,13 +11019,13 @@
   <p:clrMapOvr>
     <a:masterClrMapping/>
   </p:clrMapOvr>
-  <mc:AlternateContent xmlns:mc="http://schemas.openxmlformats.org/markup-compatibility/2006">
-    <mc:Choice xmlns:p159="http://schemas.microsoft.com/office/powerpoint/2015/09/main" Requires="p159">
+  <mc:AlternateContent xmlns:mc="http://schemas.openxmlformats.org/markup-compatibility/2006" xmlns:p159="http://schemas.microsoft.com/office/powerpoint/2015/09/main">
+    <mc:Choice Requires="p159">
       <p:transition xmlns:p14="http://schemas.microsoft.com/office/powerpoint/2010/main" spd="slow" p14:dur="2000">
         <p159:morph option="byObject"/>
       </p:transition>
     </mc:Choice>
-    <mc:Fallback>
+    <mc:Fallback xmlns="">
       <p:transition spd="slow">
         <p:fade/>
       </p:transition>
@@ -18681,7 +18686,7 @@
                 </a:effectLst>
                 <a:latin typeface="Arial Rounded MT Bold" panose="020F0704030504030204" pitchFamily="34" charset="0"/>
               </a:rPr>
-              <a:t>Rs. 10,000</a:t>
+              <a:t>Rs. 9,999</a:t>
             </a:r>
           </a:p>
         </p:txBody>
@@ -18696,13 +18701,13 @@
   <p:clrMapOvr>
     <a:masterClrMapping/>
   </p:clrMapOvr>
-  <mc:AlternateContent xmlns:mc="http://schemas.openxmlformats.org/markup-compatibility/2006">
-    <mc:Choice xmlns:p159="http://schemas.microsoft.com/office/powerpoint/2015/09/main" Requires="p159">
+  <mc:AlternateContent xmlns:mc="http://schemas.openxmlformats.org/markup-compatibility/2006" xmlns:p159="http://schemas.microsoft.com/office/powerpoint/2015/09/main">
+    <mc:Choice Requires="p159">
       <p:transition xmlns:p14="http://schemas.microsoft.com/office/powerpoint/2010/main" spd="slow" p14:dur="2000">
         <p159:morph option="byObject"/>
       </p:transition>
     </mc:Choice>
-    <mc:Fallback>
+    <mc:Fallback xmlns="">
       <p:transition spd="slow">
         <p:fade/>
       </p:transition>
@@ -26363,7 +26368,7 @@
                 </a:effectLst>
                 <a:latin typeface="Arial Rounded MT Bold" panose="020F0704030504030204" pitchFamily="34" charset="0"/>
               </a:rPr>
-              <a:t>Rs. 10,000</a:t>
+              <a:t>Rs. 9,999</a:t>
             </a:r>
           </a:p>
         </p:txBody>
@@ -26378,13 +26383,13 @@
   <p:clrMapOvr>
     <a:masterClrMapping/>
   </p:clrMapOvr>
-  <mc:AlternateContent xmlns:mc="http://schemas.openxmlformats.org/markup-compatibility/2006">
-    <mc:Choice xmlns:p159="http://schemas.microsoft.com/office/powerpoint/2015/09/main" Requires="p159">
+  <mc:AlternateContent xmlns:mc="http://schemas.openxmlformats.org/markup-compatibility/2006" xmlns:p159="http://schemas.microsoft.com/office/powerpoint/2015/09/main">
+    <mc:Choice Requires="p159">
       <p:transition xmlns:p14="http://schemas.microsoft.com/office/powerpoint/2010/main" spd="slow" p14:dur="2000">
         <p159:morph option="byObject"/>
       </p:transition>
     </mc:Choice>
-    <mc:Fallback>
+    <mc:Fallback xmlns="">
       <p:transition spd="slow">
         <p:fade/>
       </p:transition>
@@ -29121,7 +29126,7 @@
                 </a:effectLst>
                 <a:latin typeface="Arial Rounded MT Bold" panose="020F0704030504030204" pitchFamily="34" charset="0"/>
               </a:rPr>
-              <a:t>Rs. 10,000</a:t>
+              <a:t>Rs. 9,999</a:t>
             </a:r>
           </a:p>
         </p:txBody>

</xml_diff>